<commit_message>
small changes - plan
</commit_message>
<xml_diff>
--- a/sesija-18/PPT/Front-End Developer-18.pptx
+++ b/sesija-18/PPT/Front-End Developer-18.pptx
@@ -6,13 +6,14 @@
     <p:sldMasterId id="2147483676" r:id="rId2"/>
   </p:sldMasterIdLst>
   <p:notesMasterIdLst>
-    <p:notesMasterId r:id="rId7"/>
+    <p:notesMasterId r:id="rId8"/>
   </p:notesMasterIdLst>
   <p:sldIdLst>
     <p:sldId id="256" r:id="rId3"/>
     <p:sldId id="257" r:id="rId4"/>
     <p:sldId id="258" r:id="rId5"/>
     <p:sldId id="263" r:id="rId6"/>
+    <p:sldId id="264" r:id="rId7"/>
   </p:sldIdLst>
   <p:sldSz cx="12192000" cy="6858000"/>
   <p:notesSz cx="6858000" cy="9144000"/>
@@ -120,6 +121,7 @@
             <p14:sldId id="257"/>
             <p14:sldId id="258"/>
             <p14:sldId id="263"/>
+            <p14:sldId id="264"/>
           </p14:sldIdLst>
         </p14:section>
       </p14:sectionLst>
@@ -939,6 +941,10 @@
         <a:bodyPr/>
         <a:lstStyle/>
         <a:p>
+          <a:r>
+            <a:rPr lang="en-US" smtClean="0"/>
+            <a:t>DOM manipulation - nastavak</a:t>
+          </a:r>
           <a:endParaRPr lang="en-US"/>
         </a:p>
       </dgm:t>
@@ -1033,7 +1039,7 @@
       </dsp:nvSpPr>
       <dsp:spPr>
         <a:xfrm>
-          <a:off x="0" y="1548347"/>
+          <a:off x="0" y="1329704"/>
           <a:ext cx="8298873" cy="1521000"/>
         </a:xfrm>
         <a:prstGeom prst="roundRect">
@@ -1099,7 +1105,7 @@
         </a:p>
       </dsp:txBody>
       <dsp:txXfrm>
-        <a:off x="74249" y="1622596"/>
+        <a:off x="74249" y="1403953"/>
         <a:ext cx="8150375" cy="1372502"/>
       </dsp:txXfrm>
     </dsp:sp>
@@ -1110,8 +1116,8 @@
       </dsp:nvSpPr>
       <dsp:spPr>
         <a:xfrm>
-          <a:off x="0" y="3069347"/>
-          <a:ext cx="8298873" cy="1076400"/>
+          <a:off x="0" y="2850704"/>
+          <a:ext cx="8298873" cy="1513687"/>
         </a:xfrm>
         <a:prstGeom prst="rect">
           <a:avLst/>
@@ -1152,12 +1158,16 @@
             </a:spcAft>
             <a:buChar char="••"/>
           </a:pPr>
+          <a:r>
+            <a:rPr lang="en-US" sz="5100" kern="1200" smtClean="0"/>
+            <a:t>DOM manipulation - nastavak</a:t>
+          </a:r>
           <a:endParaRPr lang="en-US" sz="5100" kern="1200"/>
         </a:p>
       </dsp:txBody>
       <dsp:txXfrm>
-        <a:off x="0" y="3069347"/>
-        <a:ext cx="8298873" cy="1076400"/>
+        <a:off x="0" y="2850704"/>
+        <a:ext cx="8298873" cy="1513687"/>
       </dsp:txXfrm>
     </dsp:sp>
   </dsp:spTree>
@@ -2447,7 +2457,7 @@
           <a:p>
             <a:fld id="{D32AC403-8EB1-4D4E-8C3A-24BD19820531}" type="datetimeFigureOut">
               <a:rPr lang="en-US" smtClean="0"/>
-              <a:t>13-Mar-18</a:t>
+              <a:t>19-Mar-18</a:t>
             </a:fld>
             <a:endParaRPr lang="en-US"/>
           </a:p>
@@ -3193,7 +3203,7 @@
           <a:p>
             <a:fld id="{B35B300D-7DF5-4E96-8AA6-60E94C6E9F44}" type="datetimeFigureOut">
               <a:rPr lang="sr-Latn-RS" smtClean="0"/>
-              <a:t>13.3.2018.</a:t>
+              <a:t>19.3.2018.</a:t>
             </a:fld>
             <a:endParaRPr lang="sr-Latn-RS"/>
           </a:p>
@@ -3627,7 +3637,7 @@
           <a:p>
             <a:fld id="{B35B300D-7DF5-4E96-8AA6-60E94C6E9F44}" type="datetimeFigureOut">
               <a:rPr lang="sr-Latn-RS" smtClean="0"/>
-              <a:t>13.3.2018.</a:t>
+              <a:t>19.3.2018.</a:t>
             </a:fld>
             <a:endParaRPr lang="sr-Latn-RS"/>
           </a:p>
@@ -4001,7 +4011,7 @@
           <a:p>
             <a:fld id="{B35B300D-7DF5-4E96-8AA6-60E94C6E9F44}" type="datetimeFigureOut">
               <a:rPr lang="sr-Latn-RS" smtClean="0"/>
-              <a:t>13.3.2018.</a:t>
+              <a:t>19.3.2018.</a:t>
             </a:fld>
             <a:endParaRPr lang="sr-Latn-RS"/>
           </a:p>
@@ -4285,7 +4295,7 @@
           <a:p>
             <a:fld id="{B35B300D-7DF5-4E96-8AA6-60E94C6E9F44}" type="datetimeFigureOut">
               <a:rPr lang="sr-Latn-RS" smtClean="0"/>
-              <a:t>13.3.2018.</a:t>
+              <a:t>19.3.2018.</a:t>
             </a:fld>
             <a:endParaRPr lang="sr-Latn-RS"/>
           </a:p>
@@ -4462,7 +4472,7 @@
           <a:p>
             <a:fld id="{B35B300D-7DF5-4E96-8AA6-60E94C6E9F44}" type="datetimeFigureOut">
               <a:rPr lang="sr-Latn-RS" smtClean="0"/>
-              <a:t>13.3.2018.</a:t>
+              <a:t>19.3.2018.</a:t>
             </a:fld>
             <a:endParaRPr lang="sr-Latn-RS"/>
           </a:p>
@@ -4649,7 +4659,7 @@
           <a:p>
             <a:fld id="{B35B300D-7DF5-4E96-8AA6-60E94C6E9F44}" type="datetimeFigureOut">
               <a:rPr lang="sr-Latn-RS" smtClean="0"/>
-              <a:t>13.3.2018.</a:t>
+              <a:t>19.3.2018.</a:t>
             </a:fld>
             <a:endParaRPr lang="sr-Latn-RS"/>
           </a:p>
@@ -4896,7 +4906,7 @@
           <a:p>
             <a:fld id="{B35B300D-7DF5-4E96-8AA6-60E94C6E9F44}" type="datetimeFigureOut">
               <a:rPr lang="sr-Latn-RS" smtClean="0"/>
-              <a:t>13.3.2018.</a:t>
+              <a:t>19.3.2018.</a:t>
             </a:fld>
             <a:endParaRPr lang="sr-Latn-RS"/>
           </a:p>
@@ -5180,7 +5190,7 @@
           <a:p>
             <a:fld id="{B35B300D-7DF5-4E96-8AA6-60E94C6E9F44}" type="datetimeFigureOut">
               <a:rPr lang="sr-Latn-RS" smtClean="0"/>
-              <a:t>13.3.2018.</a:t>
+              <a:t>19.3.2018.</a:t>
             </a:fld>
             <a:endParaRPr lang="sr-Latn-RS"/>
           </a:p>
@@ -7099,7 +7109,7 @@
           <a:p>
             <a:fld id="{B35B300D-7DF5-4E96-8AA6-60E94C6E9F44}" type="datetimeFigureOut">
               <a:rPr lang="sr-Latn-RS" smtClean="0"/>
-              <a:t>13.3.2018.</a:t>
+              <a:t>19.3.2018.</a:t>
             </a:fld>
             <a:endParaRPr lang="sr-Latn-RS"/>
           </a:p>
@@ -7533,15 +7543,7 @@
             </a:br>
             <a:r>
               <a:rPr lang="en-US" b="1" smtClean="0"/>
-              <a:t>18 </a:t>
-            </a:r>
-            <a:r>
-              <a:rPr lang="en-US" b="1" smtClean="0"/>
-              <a:t>– </a:t>
-            </a:r>
-            <a:r>
-              <a:rPr lang="en-US" b="1" smtClean="0"/>
-              <a:t>21.03.2018</a:t>
+              <a:t>18 – 21.03.2018</a:t>
             </a:r>
             <a:endParaRPr lang="en-US"/>
           </a:p>
@@ -7670,7 +7672,7 @@
           <p:nvPr>
             <p:extLst>
               <p:ext uri="{D42A27DB-BD31-4B8C-83A1-F6EECF244321}">
-                <p14:modId xmlns:p14="http://schemas.microsoft.com/office/powerpoint/2010/main" val="571710413"/>
+                <p14:modId xmlns:p14="http://schemas.microsoft.com/office/powerpoint/2010/main" val="1229460459"/>
               </p:ext>
             </p:extLst>
           </p:nvPr>
@@ -7795,6 +7797,47 @@
           <a:lstStyle/>
           <a:p>
             <a:pPr lvl="1"/>
+            <a:r>
+              <a:rPr lang="en-US" smtClean="0"/>
+              <a:t>&lt;table&gt;</a:t>
+            </a:r>
+          </a:p>
+          <a:p>
+            <a:pPr lvl="1"/>
+            <a:r>
+              <a:rPr lang="en-US" smtClean="0"/>
+              <a:t>&lt;td&gt;</a:t>
+            </a:r>
+          </a:p>
+          <a:p>
+            <a:pPr lvl="1"/>
+            <a:r>
+              <a:rPr lang="en-US" smtClean="0"/>
+              <a:t>&lt;th&gt;</a:t>
+            </a:r>
+          </a:p>
+          <a:p>
+            <a:pPr lvl="1"/>
+            <a:r>
+              <a:rPr lang="en-US" smtClean="0"/>
+              <a:t>&lt;tr&gt;</a:t>
+            </a:r>
+          </a:p>
+          <a:p>
+            <a:pPr marL="457200" lvl="1" indent="0">
+              <a:buNone/>
+            </a:pPr>
+            <a:r>
+              <a:rPr lang="en-US" smtClean="0"/>
+              <a:t>rowspan</a:t>
+            </a:r>
+          </a:p>
+          <a:p>
+            <a:pPr lvl="1"/>
+            <a:r>
+              <a:rPr lang="en-US" smtClean="0"/>
+              <a:t>colspan</a:t>
+            </a:r>
             <a:endParaRPr lang="en-US" smtClean="0"/>
           </a:p>
         </p:txBody>
@@ -7823,6 +7866,35 @@
           </a:prstGeom>
         </p:spPr>
       </p:pic>
+      <p:sp>
+        <p:nvSpPr>
+          <p:cNvPr id="5" name="Content Placeholder 2"/>
+          <p:cNvSpPr>
+            <a:spLocks noGrp="1"/>
+          </p:cNvSpPr>
+          <p:nvPr>
+            <p:ph sz="half" idx="4294967295"/>
+          </p:nvPr>
+        </p:nvSpPr>
+        <p:spPr>
+          <a:xfrm>
+            <a:off x="5946371" y="1825625"/>
+            <a:ext cx="5570538" cy="4351338"/>
+          </a:xfrm>
+        </p:spPr>
+        <p:txBody>
+          <a:bodyPr/>
+          <a:lstStyle/>
+          <a:p>
+            <a:pPr lvl="1"/>
+            <a:r>
+              <a:rPr lang="en-US" smtClean="0"/>
+              <a:t>Nacini da se event doda na HTML element</a:t>
+            </a:r>
+            <a:endParaRPr lang="en-US" smtClean="0"/>
+          </a:p>
+        </p:txBody>
+      </p:sp>
     </p:spTree>
     <p:extLst>
       <p:ext uri="{BB962C8B-B14F-4D97-AF65-F5344CB8AC3E}">
@@ -7906,7 +7978,7 @@
             <a:pPr lvl="0"/>
             <a:r>
               <a:rPr lang="en-US" sz="4000" smtClean="0"/>
-              <a:t>text</a:t>
+              <a:t>DOM manipulation</a:t>
             </a:r>
             <a:endParaRPr lang="en-US" sz="4000"/>
           </a:p>
@@ -7929,6 +8001,93 @@
       </p:par>
     </p:tnLst>
   </p:timing>
+</p:sld>
+</file>
+
+<file path=ppt/slides/slide5.xml><?xml version="1.0" encoding="utf-8"?>
+<p:sld xmlns:a="http://schemas.openxmlformats.org/drawingml/2006/main" xmlns:r="http://schemas.openxmlformats.org/officeDocument/2006/relationships" xmlns:p="http://schemas.openxmlformats.org/presentationml/2006/main">
+  <p:cSld>
+    <p:spTree>
+      <p:nvGrpSpPr>
+        <p:cNvPr id="1" name=""/>
+        <p:cNvGrpSpPr/>
+        <p:nvPr/>
+      </p:nvGrpSpPr>
+      <p:grpSpPr>
+        <a:xfrm>
+          <a:off x="0" y="0"/>
+          <a:ext cx="0" cy="0"/>
+          <a:chOff x="0" y="0"/>
+          <a:chExt cx="0" cy="0"/>
+        </a:xfrm>
+      </p:grpSpPr>
+      <p:sp>
+        <p:nvSpPr>
+          <p:cNvPr id="3" name="Title 2"/>
+          <p:cNvSpPr>
+            <a:spLocks noGrp="1"/>
+          </p:cNvSpPr>
+          <p:nvPr>
+            <p:ph type="title"/>
+          </p:nvPr>
+        </p:nvSpPr>
+        <p:spPr/>
+        <p:txBody>
+          <a:bodyPr/>
+          <a:lstStyle/>
+          <a:p>
+            <a:endParaRPr lang="sr-Latn-RS"/>
+          </a:p>
+        </p:txBody>
+      </p:sp>
+      <p:sp>
+        <p:nvSpPr>
+          <p:cNvPr id="4" name="Content Placeholder 3"/>
+          <p:cNvSpPr>
+            <a:spLocks noGrp="1"/>
+          </p:cNvSpPr>
+          <p:nvPr>
+            <p:ph sz="half" idx="1"/>
+          </p:nvPr>
+        </p:nvSpPr>
+        <p:spPr/>
+        <p:txBody>
+          <a:bodyPr/>
+          <a:lstStyle/>
+          <a:p>
+            <a:endParaRPr lang="sr-Latn-RS"/>
+          </a:p>
+        </p:txBody>
+      </p:sp>
+      <p:sp>
+        <p:nvSpPr>
+          <p:cNvPr id="5" name="Content Placeholder 4"/>
+          <p:cNvSpPr>
+            <a:spLocks noGrp="1"/>
+          </p:cNvSpPr>
+          <p:nvPr>
+            <p:ph sz="half" idx="2"/>
+          </p:nvPr>
+        </p:nvSpPr>
+        <p:spPr/>
+        <p:txBody>
+          <a:bodyPr/>
+          <a:lstStyle/>
+          <a:p>
+            <a:endParaRPr lang="sr-Latn-RS"/>
+          </a:p>
+        </p:txBody>
+      </p:sp>
+    </p:spTree>
+    <p:extLst>
+      <p:ext uri="{BB962C8B-B14F-4D97-AF65-F5344CB8AC3E}">
+        <p14:creationId xmlns:p14="http://schemas.microsoft.com/office/powerpoint/2010/main" val="3540782906"/>
+      </p:ext>
+    </p:extLst>
+  </p:cSld>
+  <p:clrMapOvr>
+    <a:masterClrMapping/>
+  </p:clrMapOvr>
 </p:sld>
 </file>
 

</xml_diff>